<commit_message>
Add "GUI", update powerpoint CLI
Alex what is that HP-CLi file?
</commit_message>
<xml_diff>
--- a/Documentation/HP-CLI_example.pptx
+++ b/Documentation/HP-CLI_example.pptx
@@ -119,6 +119,11 @@
       </a:defRPr>
     </a:lvl9pPr>
   </p:defaultTextStyle>
+  <p:extLst>
+    <p:ext uri="{EFAFB233-063F-42B5-8137-9DF3F51BA10A}">
+      <p15:sldGuideLst xmlns:p15="http://schemas.microsoft.com/office/powerpoint/2012/main"/>
+    </p:ext>
+  </p:extLst>
 </p:presentation>
 </file>
 
@@ -269,7 +274,7 @@
           <a:p>
             <a:fld id="{33EF82CD-0A58-4573-B32F-5F75961ADD5D}" type="datetimeFigureOut">
               <a:rPr lang="en-US" smtClean="0"/>
-              <a:t>11/11/2019</a:t>
+              <a:t>11/15/2019</a:t>
             </a:fld>
             <a:endParaRPr lang="en-US"/>
           </a:p>
@@ -467,7 +472,7 @@
           <a:p>
             <a:fld id="{33EF82CD-0A58-4573-B32F-5F75961ADD5D}" type="datetimeFigureOut">
               <a:rPr lang="en-US" smtClean="0"/>
-              <a:t>11/11/2019</a:t>
+              <a:t>11/15/2019</a:t>
             </a:fld>
             <a:endParaRPr lang="en-US"/>
           </a:p>
@@ -675,7 +680,7 @@
           <a:p>
             <a:fld id="{33EF82CD-0A58-4573-B32F-5F75961ADD5D}" type="datetimeFigureOut">
               <a:rPr lang="en-US" smtClean="0"/>
-              <a:t>11/11/2019</a:t>
+              <a:t>11/15/2019</a:t>
             </a:fld>
             <a:endParaRPr lang="en-US"/>
           </a:p>
@@ -873,7 +878,7 @@
           <a:p>
             <a:fld id="{33EF82CD-0A58-4573-B32F-5F75961ADD5D}" type="datetimeFigureOut">
               <a:rPr lang="en-US" smtClean="0"/>
-              <a:t>11/11/2019</a:t>
+              <a:t>11/15/2019</a:t>
             </a:fld>
             <a:endParaRPr lang="en-US"/>
           </a:p>
@@ -1148,7 +1153,7 @@
           <a:p>
             <a:fld id="{33EF82CD-0A58-4573-B32F-5F75961ADD5D}" type="datetimeFigureOut">
               <a:rPr lang="en-US" smtClean="0"/>
-              <a:t>11/11/2019</a:t>
+              <a:t>11/15/2019</a:t>
             </a:fld>
             <a:endParaRPr lang="en-US"/>
           </a:p>
@@ -1413,7 +1418,7 @@
           <a:p>
             <a:fld id="{33EF82CD-0A58-4573-B32F-5F75961ADD5D}" type="datetimeFigureOut">
               <a:rPr lang="en-US" smtClean="0"/>
-              <a:t>11/11/2019</a:t>
+              <a:t>11/15/2019</a:t>
             </a:fld>
             <a:endParaRPr lang="en-US"/>
           </a:p>
@@ -1825,7 +1830,7 @@
           <a:p>
             <a:fld id="{33EF82CD-0A58-4573-B32F-5F75961ADD5D}" type="datetimeFigureOut">
               <a:rPr lang="en-US" smtClean="0"/>
-              <a:t>11/11/2019</a:t>
+              <a:t>11/15/2019</a:t>
             </a:fld>
             <a:endParaRPr lang="en-US"/>
           </a:p>
@@ -1966,7 +1971,7 @@
           <a:p>
             <a:fld id="{33EF82CD-0A58-4573-B32F-5F75961ADD5D}" type="datetimeFigureOut">
               <a:rPr lang="en-US" smtClean="0"/>
-              <a:t>11/11/2019</a:t>
+              <a:t>11/15/2019</a:t>
             </a:fld>
             <a:endParaRPr lang="en-US"/>
           </a:p>
@@ -2079,7 +2084,7 @@
           <a:p>
             <a:fld id="{33EF82CD-0A58-4573-B32F-5F75961ADD5D}" type="datetimeFigureOut">
               <a:rPr lang="en-US" smtClean="0"/>
-              <a:t>11/11/2019</a:t>
+              <a:t>11/15/2019</a:t>
             </a:fld>
             <a:endParaRPr lang="en-US"/>
           </a:p>
@@ -2390,7 +2395,7 @@
           <a:p>
             <a:fld id="{33EF82CD-0A58-4573-B32F-5F75961ADD5D}" type="datetimeFigureOut">
               <a:rPr lang="en-US" smtClean="0"/>
-              <a:t>11/11/2019</a:t>
+              <a:t>11/15/2019</a:t>
             </a:fld>
             <a:endParaRPr lang="en-US"/>
           </a:p>
@@ -2678,7 +2683,7 @@
           <a:p>
             <a:fld id="{33EF82CD-0A58-4573-B32F-5F75961ADD5D}" type="datetimeFigureOut">
               <a:rPr lang="en-US" smtClean="0"/>
-              <a:t>11/11/2019</a:t>
+              <a:t>11/15/2019</a:t>
             </a:fld>
             <a:endParaRPr lang="en-US"/>
           </a:p>
@@ -2919,7 +2924,7 @@
           <a:p>
             <a:fld id="{33EF82CD-0A58-4573-B32F-5F75961ADD5D}" type="datetimeFigureOut">
               <a:rPr lang="en-US" smtClean="0"/>
-              <a:t>11/11/2019</a:t>
+              <a:t>11/15/2019</a:t>
             </a:fld>
             <a:endParaRPr lang="en-US"/>
           </a:p>
@@ -3452,7 +3457,7 @@
                   </a:schemeClr>
                 </a:solidFill>
               </a:rPr>
-              <a:t>(1) Log In</a:t>
+              <a:t>&gt; 1 Log In</a:t>
             </a:r>
           </a:p>
           <a:p>
@@ -3465,7 +3470,7 @@
                   </a:schemeClr>
                 </a:solidFill>
               </a:rPr>
-              <a:t>(2) Exit</a:t>
+              <a:t>&gt; 2 Exit</a:t>
             </a:r>
           </a:p>
         </p:txBody>
@@ -3820,7 +3825,7 @@
                   </a:schemeClr>
                 </a:solidFill>
               </a:rPr>
-              <a:t>(1) 420</a:t>
+              <a:t>&gt; 1 420</a:t>
             </a:r>
           </a:p>
           <a:p>
@@ -3832,7 +3837,7 @@
                   </a:schemeClr>
                 </a:solidFill>
               </a:rPr>
-              <a:t>(2) Return to Main Menu</a:t>
+              <a:t>&gt; 2 Return to Main Menu</a:t>
             </a:r>
             <a:endParaRPr lang="en-US" sz="2400" dirty="0"/>
           </a:p>
@@ -5351,9 +5356,7 @@
           <a:bodyPr/>
           <a:lstStyle/>
           <a:p>
-            <a:pPr marL="457200" indent="-457200" algn="l">
-              <a:buAutoNum type="arabicParenBoth"/>
-            </a:pPr>
+            <a:pPr algn="l"/>
             <a:r>
               <a:rPr lang="en-US" dirty="0">
                 <a:solidFill>
@@ -5362,13 +5365,11 @@
                   </a:schemeClr>
                 </a:solidFill>
               </a:rPr>
-              <a:t>Book a Room</a:t>
-            </a:r>
-          </a:p>
-          <a:p>
-            <a:pPr marL="457200" indent="-457200" algn="l">
-              <a:buAutoNum type="arabicParenBoth"/>
-            </a:pPr>
+              <a:t>&gt; 1 Book a Room</a:t>
+            </a:r>
+          </a:p>
+          <a:p>
+            <a:pPr algn="l"/>
             <a:r>
               <a:rPr lang="en-US" dirty="0">
                 <a:solidFill>
@@ -5377,13 +5378,11 @@
                   </a:schemeClr>
                 </a:solidFill>
               </a:rPr>
-              <a:t>See my Bookings</a:t>
-            </a:r>
-          </a:p>
-          <a:p>
-            <a:pPr marL="457200" indent="-457200" algn="l">
-              <a:buAutoNum type="arabicParenBoth"/>
-            </a:pPr>
+              <a:t>&gt; 2 See my Bookings</a:t>
+            </a:r>
+          </a:p>
+          <a:p>
+            <a:pPr algn="l"/>
             <a:r>
               <a:rPr lang="en-US" dirty="0">
                 <a:solidFill>
@@ -5392,13 +5391,11 @@
                   </a:schemeClr>
                 </a:solidFill>
               </a:rPr>
-              <a:t>Request Room Clearing (FBI)</a:t>
-            </a:r>
-          </a:p>
-          <a:p>
-            <a:pPr marL="457200" indent="-457200" algn="l">
-              <a:buAutoNum type="arabicParenBoth"/>
-            </a:pPr>
+              <a:t>&gt; 3 Request Room Clearing (FBI)</a:t>
+            </a:r>
+          </a:p>
+          <a:p>
+            <a:pPr algn="l"/>
             <a:r>
               <a:rPr lang="en-US" dirty="0">
                 <a:solidFill>
@@ -5407,7 +5404,7 @@
                   </a:schemeClr>
                 </a:solidFill>
               </a:rPr>
-              <a:t>Log Out</a:t>
+              <a:t>&gt; 4 Log Out</a:t>
             </a:r>
           </a:p>
           <a:p>
@@ -5765,9 +5762,6 @@
           </a:bodyPr>
           <a:lstStyle/>
           <a:p>
-            <a:pPr marL="457200" indent="-457200">
-              <a:buAutoNum type="arabicParenBoth"/>
-            </a:pPr>
             <a:r>
               <a:rPr lang="en-US" sz="2400" dirty="0">
                 <a:solidFill>
@@ -5776,13 +5770,10 @@
                   </a:schemeClr>
                 </a:solidFill>
               </a:rPr>
-              <a:t>Cancel a Booking</a:t>
-            </a:r>
-          </a:p>
-          <a:p>
-            <a:pPr marL="457200" indent="-457200">
-              <a:buAutoNum type="arabicParenBoth"/>
-            </a:pPr>
+              <a:t>&gt; 1 Cancel a Booking</a:t>
+            </a:r>
+          </a:p>
+          <a:p>
             <a:r>
               <a:rPr lang="en-US" sz="2400" dirty="0">
                 <a:solidFill>
@@ -5791,7 +5782,7 @@
                   </a:schemeClr>
                 </a:solidFill>
               </a:rPr>
-              <a:t>Return</a:t>
+              <a:t>&gt; 2 Return</a:t>
             </a:r>
           </a:p>
           <a:p>
@@ -6333,7 +6324,7 @@
                   </a:schemeClr>
                 </a:solidFill>
               </a:rPr>
-              <a:t> &gt; 1    Book a Room</a:t>
+              <a:t>&gt; 1 Book a Room</a:t>
             </a:r>
             <a:br>
               <a:rPr lang="en-US" dirty="0">
@@ -6344,18 +6335,6 @@
                 </a:solidFill>
               </a:rPr>
             </a:br>
-            <a:endParaRPr lang="en-US" dirty="0">
-              <a:solidFill>
-                <a:schemeClr val="bg1">
-                  <a:lumMod val="95000"/>
-                </a:schemeClr>
-              </a:solidFill>
-            </a:endParaRPr>
-          </a:p>
-          <a:p>
-            <a:pPr marL="457200" indent="-457200" algn="l">
-              <a:buAutoNum type="arabicParenBoth"/>
-            </a:pPr>
             <a:r>
               <a:rPr lang="en-US" dirty="0">
                 <a:solidFill>
@@ -6364,14 +6343,9 @@
                   </a:schemeClr>
                 </a:solidFill>
               </a:rPr>
-              <a:t>See my Bookings</a:t>
-            </a:r>
-          </a:p>
-          <a:p>
-            <a:pPr marL="457200" indent="-457200" algn="l">
-              <a:buAutoNum type="arabicParenBoth"/>
-            </a:pPr>
-            <a:r>
+              <a:t>&gt; 2 See my Bookings</a:t>
+            </a:r>
+            <a:br>
               <a:rPr lang="en-US" dirty="0">
                 <a:solidFill>
                   <a:schemeClr val="bg1">
@@ -6379,13 +6353,7 @@
                   </a:schemeClr>
                 </a:solidFill>
               </a:rPr>
-              <a:t>Request Room Clearing (FBI)</a:t>
-            </a:r>
-          </a:p>
-          <a:p>
-            <a:pPr marL="457200" indent="-457200" algn="l">
-              <a:buAutoNum type="arabicParenBoth"/>
-            </a:pPr>
+            </a:br>
             <a:r>
               <a:rPr lang="en-US" dirty="0">
                 <a:solidFill>
@@ -6394,7 +6362,26 @@
                   </a:schemeClr>
                 </a:solidFill>
               </a:rPr>
-              <a:t>Log Out</a:t>
+              <a:t>&gt; 3 Request Room Clearing (FBI)</a:t>
+            </a:r>
+            <a:br>
+              <a:rPr lang="en-US" dirty="0">
+                <a:solidFill>
+                  <a:schemeClr val="bg1">
+                    <a:lumMod val="95000"/>
+                  </a:schemeClr>
+                </a:solidFill>
+              </a:rPr>
+            </a:br>
+            <a:r>
+              <a:rPr lang="en-US" dirty="0">
+                <a:solidFill>
+                  <a:schemeClr val="bg1">
+                    <a:lumMod val="95000"/>
+                  </a:schemeClr>
+                </a:solidFill>
+              </a:rPr>
+              <a:t>&gt; 4 Log Out</a:t>
             </a:r>
           </a:p>
           <a:p>
@@ -6745,9 +6732,6 @@
           </a:bodyPr>
           <a:lstStyle/>
           <a:p>
-            <a:pPr marL="457200" indent="-457200">
-              <a:buAutoNum type="arabicParenBoth"/>
-            </a:pPr>
             <a:r>
               <a:rPr lang="en-US" sz="2400" dirty="0">
                 <a:solidFill>
@@ -6756,13 +6740,10 @@
                   </a:schemeClr>
                 </a:solidFill>
               </a:rPr>
-              <a:t>Filter</a:t>
-            </a:r>
-          </a:p>
-          <a:p>
-            <a:pPr marL="457200" indent="-457200">
-              <a:buAutoNum type="arabicParenBoth"/>
-            </a:pPr>
+              <a:t>&gt; 1 Filter</a:t>
+            </a:r>
+          </a:p>
+          <a:p>
             <a:r>
               <a:rPr lang="en-US" sz="2400" dirty="0">
                 <a:solidFill>
@@ -6771,13 +6752,10 @@
                   </a:schemeClr>
                 </a:solidFill>
               </a:rPr>
-              <a:t>Choose a Room</a:t>
-            </a:r>
-          </a:p>
-          <a:p>
-            <a:pPr marL="457200" indent="-457200">
-              <a:buAutoNum type="arabicParenBoth"/>
-            </a:pPr>
+              <a:t>&gt; 2 Choose a Room</a:t>
+            </a:r>
+          </a:p>
+          <a:p>
             <a:r>
               <a:rPr lang="en-US" sz="2400" dirty="0">
                 <a:solidFill>
@@ -6786,7 +6764,7 @@
                   </a:schemeClr>
                 </a:solidFill>
               </a:rPr>
-              <a:t>Return</a:t>
+              <a:t>&gt; 3 Return</a:t>
             </a:r>
           </a:p>
           <a:p>
@@ -7747,7 +7725,7 @@
                   </a:schemeClr>
                 </a:solidFill>
               </a:rPr>
-              <a:t>(1) MOAH FILTERS</a:t>
+              <a:t>&gt; 1 MOAH FILTERS</a:t>
             </a:r>
             <a:br>
               <a:rPr lang="en-US" sz="2400" dirty="0">
@@ -7766,7 +7744,7 @@
                   </a:schemeClr>
                 </a:solidFill>
               </a:rPr>
-              <a:t>(2) No, I’m ready to choose</a:t>
+              <a:t>&gt; 2 No, I’m ready to choose</a:t>
             </a:r>
             <a:br>
               <a:rPr lang="en-US" sz="2400" dirty="0">
@@ -7785,7 +7763,7 @@
                   </a:schemeClr>
                 </a:solidFill>
               </a:rPr>
-              <a:t>(3) Return to Main Menu</a:t>
+              <a:t>&gt; 3 Return to Main Menu</a:t>
             </a:r>
             <a:endParaRPr lang="en-US" sz="2400" dirty="0"/>
           </a:p>

</xml_diff>